<commit_message>
draft (except for ADS appendix) - to be improved
</commit_message>
<xml_diff>
--- a/img/under construction/neurimplfigure.pptx
+++ b/img/under construction/neurimplfigure.pptx
@@ -5,11 +5,15 @@
     <p:sldMasterId id="2147483648" r:id="rId1"/>
   </p:sldMasterIdLst>
   <p:notesMasterIdLst>
-    <p:notesMasterId r:id="rId4"/>
+    <p:notesMasterId r:id="rId8"/>
   </p:notesMasterIdLst>
   <p:sldIdLst>
     <p:sldId id="256" r:id="rId2"/>
-    <p:sldId id="257" r:id="rId3"/>
+    <p:sldId id="261" r:id="rId3"/>
+    <p:sldId id="257" r:id="rId4"/>
+    <p:sldId id="260" r:id="rId5"/>
+    <p:sldId id="258" r:id="rId6"/>
+    <p:sldId id="259" r:id="rId7"/>
   </p:sldIdLst>
   <p:sldSz cx="12192000" cy="6858000"/>
   <p:notesSz cx="6858000" cy="9144000"/>
@@ -625,6 +629,106 @@
     <p:extLst>
       <p:ext uri="{BB962C8B-B14F-4D97-AF65-F5344CB8AC3E}">
         <p14:creationId xmlns:p14="http://schemas.microsoft.com/office/powerpoint/2010/main" val="464064770"/>
+      </p:ext>
+    </p:extLst>
+  </p:cSld>
+  <p:clrMapOvr>
+    <a:masterClrMapping/>
+  </p:clrMapOvr>
+</p:notes>
+</file>
+
+<file path=ppt/notesSlides/notesSlide2.xml><?xml version="1.0" encoding="utf-8"?>
+<p:notes xmlns:a="http://schemas.openxmlformats.org/drawingml/2006/main" xmlns:r="http://schemas.openxmlformats.org/officeDocument/2006/relationships" xmlns:p="http://schemas.openxmlformats.org/presentationml/2006/main">
+  <p:cSld>
+    <p:spTree>
+      <p:nvGrpSpPr>
+        <p:cNvPr id="1" name=""/>
+        <p:cNvGrpSpPr/>
+        <p:nvPr/>
+      </p:nvGrpSpPr>
+      <p:grpSpPr>
+        <a:xfrm>
+          <a:off x="0" y="0"/>
+          <a:ext cx="0" cy="0"/>
+          <a:chOff x="0" y="0"/>
+          <a:chExt cx="0" cy="0"/>
+        </a:xfrm>
+      </p:grpSpPr>
+      <p:sp>
+        <p:nvSpPr>
+          <p:cNvPr id="2" name="Folienbildplatzhalter 1"/>
+          <p:cNvSpPr>
+            <a:spLocks noGrp="1" noRot="1" noChangeAspect="1"/>
+          </p:cNvSpPr>
+          <p:nvPr>
+            <p:ph type="sldImg"/>
+          </p:nvPr>
+        </p:nvSpPr>
+        <p:spPr/>
+      </p:sp>
+      <p:sp>
+        <p:nvSpPr>
+          <p:cNvPr id="3" name="Notizenplatzhalter 2"/>
+          <p:cNvSpPr>
+            <a:spLocks noGrp="1"/>
+          </p:cNvSpPr>
+          <p:nvPr>
+            <p:ph type="body" idx="1"/>
+          </p:nvPr>
+        </p:nvSpPr>
+        <p:spPr/>
+        <p:txBody>
+          <a:bodyPr/>
+          <a:lstStyle/>
+          <a:p>
+            <a:r>
+              <a:rPr lang="de-AT" dirty="0" err="1" smtClean="0"/>
+              <a:t>Pilly</a:t>
+            </a:r>
+            <a:r>
+              <a:rPr lang="de-AT" dirty="0" smtClean="0"/>
+              <a:t> &amp; </a:t>
+            </a:r>
+            <a:r>
+              <a:rPr lang="de-AT" dirty="0" err="1" smtClean="0"/>
+              <a:t>grossberg</a:t>
+            </a:r>
+            <a:r>
+              <a:rPr lang="de-AT" dirty="0" smtClean="0"/>
+              <a:t> 2012</a:t>
+            </a:r>
+            <a:endParaRPr lang="en-GB" dirty="0"/>
+          </a:p>
+        </p:txBody>
+      </p:sp>
+      <p:sp>
+        <p:nvSpPr>
+          <p:cNvPr id="4" name="Foliennummernplatzhalter 3"/>
+          <p:cNvSpPr>
+            <a:spLocks noGrp="1"/>
+          </p:cNvSpPr>
+          <p:nvPr>
+            <p:ph type="sldNum" sz="quarter" idx="10"/>
+          </p:nvPr>
+        </p:nvSpPr>
+        <p:spPr/>
+        <p:txBody>
+          <a:bodyPr/>
+          <a:lstStyle/>
+          <a:p>
+            <a:fld id="{8F5698BE-FF65-4E5F-8811-B358A51566C5}" type="slidenum">
+              <a:rPr lang="de-AT" smtClean="0"/>
+              <a:t>5</a:t>
+            </a:fld>
+            <a:endParaRPr lang="de-AT"/>
+          </a:p>
+        </p:txBody>
+      </p:sp>
+    </p:spTree>
+    <p:extLst>
+      <p:ext uri="{BB962C8B-B14F-4D97-AF65-F5344CB8AC3E}">
+        <p14:creationId xmlns:p14="http://schemas.microsoft.com/office/powerpoint/2010/main" val="1956589854"/>
       </p:ext>
     </p:extLst>
   </p:cSld>
@@ -3493,18 +3597,44 @@
       </p:grpSpPr>
       <p:sp>
         <p:nvSpPr>
-          <p:cNvPr id="4" name="Rechteck 3"/>
+          <p:cNvPr id="5" name="Rechteck 4"/>
           <p:cNvSpPr/>
           <p:nvPr/>
         </p:nvSpPr>
         <p:spPr>
           <a:xfrm>
-            <a:off x="2324576" y="5720636"/>
+            <a:off x="2324576" y="4156531"/>
             <a:ext cx="3400926" cy="1106905"/>
           </a:xfrm>
           <a:prstGeom prst="rect">
             <a:avLst/>
           </a:prstGeom>
+          <a:gradFill flip="none" rotWithShape="1">
+            <a:gsLst>
+              <a:gs pos="54000">
+                <a:srgbClr val="006600"/>
+              </a:gs>
+              <a:gs pos="33000">
+                <a:schemeClr val="bg1"/>
+              </a:gs>
+              <a:gs pos="0">
+                <a:schemeClr val="accent3">
+                  <a:lumMod val="5000"/>
+                  <a:lumOff val="95000"/>
+                </a:schemeClr>
+              </a:gs>
+              <a:gs pos="100000">
+                <a:srgbClr val="006600"/>
+              </a:gs>
+            </a:gsLst>
+            <a:lin ang="0" scaled="1"/>
+            <a:tileRect/>
+          </a:gradFill>
+          <a:ln w="28575">
+            <a:solidFill>
+              <a:schemeClr val="tx1"/>
+            </a:solidFill>
+          </a:ln>
         </p:spPr>
         <p:style>
           <a:lnRef idx="1">
@@ -3526,52 +3656,26 @@
           <a:p>
             <a:pPr algn="ctr"/>
             <a:r>
-              <a:rPr lang="en-US" sz="2800" dirty="0" smtClean="0"/>
-              <a:t>Subiculum</a:t>
-            </a:r>
-            <a:endParaRPr lang="en-US" sz="2800" dirty="0"/>
-          </a:p>
-        </p:txBody>
-      </p:sp>
-      <p:sp>
-        <p:nvSpPr>
-          <p:cNvPr id="5" name="Rechteck 4"/>
-          <p:cNvSpPr/>
-          <p:nvPr/>
-        </p:nvSpPr>
-        <p:spPr>
-          <a:xfrm>
-            <a:off x="2324576" y="4156531"/>
-            <a:ext cx="3400926" cy="1106905"/>
-          </a:xfrm>
-          <a:prstGeom prst="rect">
-            <a:avLst/>
-          </a:prstGeom>
-        </p:spPr>
-        <p:style>
-          <a:lnRef idx="1">
-            <a:schemeClr val="accent1"/>
-          </a:lnRef>
-          <a:fillRef idx="3">
-            <a:schemeClr val="accent1"/>
-          </a:fillRef>
-          <a:effectRef idx="2">
-            <a:schemeClr val="accent1"/>
-          </a:effectRef>
-          <a:fontRef idx="minor">
-            <a:schemeClr val="lt1"/>
-          </a:fontRef>
-        </p:style>
-        <p:txBody>
-          <a:bodyPr rtlCol="0" anchor="ctr"/>
-          <a:lstStyle/>
-          <a:p>
-            <a:pPr algn="ctr"/>
-            <a:r>
-              <a:rPr lang="en-US" sz="2800" dirty="0" smtClean="0"/>
+              <a:rPr lang="en-US" sz="2800" dirty="0" smtClean="0">
+                <a:solidFill>
+                  <a:srgbClr val="006600"/>
+                </a:solidFill>
+              </a:rPr>
+              <a:t> </a:t>
+            </a:r>
+            <a:r>
+              <a:rPr lang="en-US" sz="2800" dirty="0" smtClean="0">
+                <a:solidFill>
+                  <a:schemeClr val="tx1"/>
+                </a:solidFill>
+              </a:rPr>
               <a:t>Hippocampus</a:t>
             </a:r>
-            <a:endParaRPr lang="en-US" sz="2800" dirty="0"/>
+            <a:endParaRPr lang="en-US" sz="2800" dirty="0">
+              <a:solidFill>
+                <a:schemeClr val="tx1"/>
+              </a:solidFill>
+            </a:endParaRPr>
           </a:p>
         </p:txBody>
       </p:sp>
@@ -3592,16 +3696,16 @@
         </p:spPr>
         <p:style>
           <a:lnRef idx="1">
-            <a:schemeClr val="accent1"/>
+            <a:schemeClr val="accent6"/>
           </a:lnRef>
-          <a:fillRef idx="3">
-            <a:schemeClr val="accent1"/>
+          <a:fillRef idx="2">
+            <a:schemeClr val="accent6"/>
           </a:fillRef>
-          <a:effectRef idx="2">
-            <a:schemeClr val="accent1"/>
+          <a:effectRef idx="1">
+            <a:schemeClr val="accent6"/>
           </a:effectRef>
           <a:fontRef idx="minor">
-            <a:schemeClr val="lt1"/>
+            <a:schemeClr val="dk1"/>
           </a:fontRef>
         </p:style>
         <p:txBody>
@@ -3638,6 +3742,9 @@
           <a:prstGeom prst="rect">
             <a:avLst/>
           </a:prstGeom>
+          <a:solidFill>
+            <a:srgbClr val="00008B"/>
+          </a:solidFill>
         </p:spPr>
         <p:style>
           <a:lnRef idx="1">
@@ -3731,14 +3838,14 @@
           </a:prstGeom>
         </p:spPr>
         <p:style>
-          <a:lnRef idx="1">
-            <a:schemeClr val="accent1"/>
+          <a:lnRef idx="3">
+            <a:schemeClr val="lt1"/>
           </a:lnRef>
-          <a:fillRef idx="3">
-            <a:schemeClr val="accent1"/>
+          <a:fillRef idx="1">
+            <a:schemeClr val="accent3"/>
           </a:fillRef>
-          <a:effectRef idx="2">
-            <a:schemeClr val="accent1"/>
+          <a:effectRef idx="1">
+            <a:schemeClr val="accent3"/>
           </a:effectRef>
           <a:fontRef idx="minor">
             <a:schemeClr val="lt1"/>
@@ -3812,8 +3919,8 @@
         </p:nvSpPr>
         <p:spPr>
           <a:xfrm>
-            <a:off x="0" y="1556521"/>
-            <a:ext cx="2181559" cy="1200329"/>
+            <a:off x="276721" y="1945359"/>
+            <a:ext cx="1752403" cy="954107"/>
           </a:xfrm>
           <a:prstGeom prst="rect">
             <a:avLst/>
@@ -3828,31 +3935,17 @@
           <a:p>
             <a:pPr algn="ctr"/>
             <a:r>
-              <a:rPr lang="en-US" dirty="0" smtClean="0"/>
-              <a:t>Recognition memory,</a:t>
+              <a:rPr lang="en-US" sz="2800" dirty="0" smtClean="0"/>
+              <a:t>Landmark </a:t>
             </a:r>
           </a:p>
           <a:p>
             <a:pPr algn="ctr"/>
             <a:r>
-              <a:rPr lang="en-US" dirty="0" smtClean="0"/>
-              <a:t>Semantic memory,</a:t>
-            </a:r>
-          </a:p>
-          <a:p>
-            <a:pPr algn="ctr"/>
-            <a:r>
-              <a:rPr lang="en-US" b="1" dirty="0" smtClean="0"/>
-              <a:t>Landmark identity,</a:t>
-            </a:r>
-          </a:p>
-          <a:p>
-            <a:pPr algn="ctr"/>
-            <a:r>
-              <a:rPr lang="en-US" b="1" dirty="0" smtClean="0"/>
-              <a:t>Landmark location</a:t>
-            </a:r>
-            <a:endParaRPr lang="en-US" b="1" dirty="0"/>
+              <a:rPr lang="en-US" sz="2800" dirty="0" smtClean="0"/>
+              <a:t>identity</a:t>
+            </a:r>
+            <a:endParaRPr lang="en-US" sz="2800" dirty="0" smtClean="0"/>
           </a:p>
         </p:txBody>
       </p:sp>
@@ -3864,8 +3957,8 @@
         </p:nvSpPr>
         <p:spPr>
           <a:xfrm>
-            <a:off x="5806014" y="1258601"/>
-            <a:ext cx="1252138" cy="646331"/>
+            <a:off x="5896231" y="1083707"/>
+            <a:ext cx="1840889" cy="954107"/>
           </a:xfrm>
           <a:prstGeom prst="rect">
             <a:avLst/>
@@ -3880,17 +3973,17 @@
           <a:p>
             <a:pPr algn="ctr"/>
             <a:r>
-              <a:rPr lang="en-US" dirty="0" smtClean="0"/>
+              <a:rPr lang="en-US" sz="2800" dirty="0" smtClean="0"/>
               <a:t>Place</a:t>
             </a:r>
           </a:p>
           <a:p>
             <a:pPr algn="ctr"/>
             <a:r>
-              <a:rPr lang="en-US" dirty="0" smtClean="0"/>
+              <a:rPr lang="en-US" sz="2800" dirty="0" smtClean="0"/>
               <a:t>recognition</a:t>
             </a:r>
-            <a:endParaRPr lang="en-US" dirty="0"/>
+            <a:endParaRPr lang="en-US" sz="2800" dirty="0"/>
           </a:p>
         </p:txBody>
       </p:sp>
@@ -3902,8 +3995,8 @@
         </p:nvSpPr>
         <p:spPr>
           <a:xfrm>
-            <a:off x="5896231" y="2506660"/>
-            <a:ext cx="1850250" cy="923330"/>
+            <a:off x="6223307" y="2850309"/>
+            <a:ext cx="1523174" cy="523220"/>
           </a:xfrm>
           <a:prstGeom prst="rect">
             <a:avLst/>
@@ -3918,30 +4011,8 @@
           <a:p>
             <a:pPr algn="ctr"/>
             <a:r>
-              <a:rPr lang="en-US" b="1" dirty="0" smtClean="0"/>
-              <a:t>Path integration</a:t>
-            </a:r>
-            <a:r>
-              <a:rPr lang="en-US" dirty="0" smtClean="0"/>
-              <a:t>,</a:t>
-            </a:r>
-          </a:p>
-          <a:p>
-            <a:pPr algn="ctr"/>
-            <a:r>
-              <a:rPr lang="en-US" dirty="0" smtClean="0"/>
-              <a:t>Cells with </a:t>
-            </a:r>
-            <a:r>
-              <a:rPr lang="en-US" b="1" dirty="0" smtClean="0"/>
-              <a:t>border-</a:t>
-            </a:r>
-          </a:p>
-          <a:p>
-            <a:pPr algn="ctr"/>
-            <a:r>
-              <a:rPr lang="en-US" b="1" dirty="0" smtClean="0"/>
-              <a:t>related firing</a:t>
+              <a:rPr lang="en-US" sz="2800" dirty="0" smtClean="0"/>
+              <a:t>Grid cells</a:t>
             </a:r>
           </a:p>
         </p:txBody>
@@ -3954,8 +4025,8 @@
         </p:nvSpPr>
         <p:spPr>
           <a:xfrm>
-            <a:off x="5896231" y="6273348"/>
-            <a:ext cx="1850250" cy="646331"/>
+            <a:off x="6036568" y="5816576"/>
+            <a:ext cx="1714445" cy="954107"/>
           </a:xfrm>
           <a:prstGeom prst="rect">
             <a:avLst/>
@@ -3970,24 +4041,21 @@
           <a:p>
             <a:pPr algn="ctr"/>
             <a:r>
-              <a:rPr lang="en-US" dirty="0" smtClean="0"/>
-              <a:t>Cells </a:t>
-            </a:r>
-            <a:r>
-              <a:rPr lang="en-US" dirty="0"/>
-              <a:t>with </a:t>
-            </a:r>
-            <a:r>
-              <a:rPr lang="en-US" b="1" dirty="0"/>
-              <a:t>border-</a:t>
+              <a:rPr lang="en-US" sz="2800" dirty="0" smtClean="0"/>
+              <a:t>Border </a:t>
             </a:r>
           </a:p>
           <a:p>
             <a:pPr algn="ctr"/>
             <a:r>
-              <a:rPr lang="en-US" b="1" dirty="0"/>
-              <a:t>related firing</a:t>
-            </a:r>
+              <a:rPr lang="en-US" sz="2800" dirty="0"/>
+              <a:t>cells, </a:t>
+            </a:r>
+            <a:r>
+              <a:rPr lang="en-US" sz="2800" dirty="0" smtClean="0"/>
+              <a:t>BVCs</a:t>
+            </a:r>
+            <a:endParaRPr lang="en-US" sz="2800" b="1" dirty="0"/>
           </a:p>
         </p:txBody>
       </p:sp>
@@ -4303,8 +4371,8 @@
         </p:nvSpPr>
         <p:spPr>
           <a:xfrm>
-            <a:off x="100639" y="4386079"/>
-            <a:ext cx="1648978" cy="923330"/>
+            <a:off x="0" y="4016747"/>
+            <a:ext cx="1857753" cy="1384995"/>
           </a:xfrm>
           <a:prstGeom prst="rect">
             <a:avLst/>
@@ -4319,23 +4387,24 @@
           <a:p>
             <a:pPr algn="ctr"/>
             <a:r>
-              <a:rPr lang="en-US" b="1" dirty="0" smtClean="0"/>
-              <a:t>Cognitive map</a:t>
+              <a:rPr lang="en-US" sz="2800" dirty="0" smtClean="0"/>
+              <a:t>Place cells</a:t>
             </a:r>
           </a:p>
           <a:p>
             <a:pPr algn="ctr"/>
             <a:r>
-              <a:rPr lang="en-US" dirty="0" smtClean="0"/>
-              <a:t>(self location,</a:t>
+              <a:rPr lang="en-US" sz="2800" dirty="0" smtClean="0"/>
+              <a:t>Landmark </a:t>
             </a:r>
           </a:p>
           <a:p>
             <a:pPr algn="ctr"/>
             <a:r>
-              <a:rPr lang="en-US" dirty="0" smtClean="0"/>
-              <a:t>object location)</a:t>
-            </a:r>
+              <a:rPr lang="en-US" sz="2800" dirty="0" smtClean="0"/>
+              <a:t>vector cells</a:t>
+            </a:r>
+            <a:endParaRPr lang="en-US" sz="2800" dirty="0" smtClean="0"/>
           </a:p>
         </p:txBody>
       </p:sp>
@@ -4517,6 +4586,56 @@
           </a:fontRef>
         </p:style>
       </p:cxnSp>
+      <p:sp>
+        <p:nvSpPr>
+          <p:cNvPr id="34" name="Rechteck 33"/>
+          <p:cNvSpPr/>
+          <p:nvPr/>
+        </p:nvSpPr>
+        <p:spPr>
+          <a:xfrm>
+            <a:off x="2324273" y="5719164"/>
+            <a:ext cx="3400926" cy="1106905"/>
+          </a:xfrm>
+          <a:prstGeom prst="rect">
+            <a:avLst/>
+          </a:prstGeom>
+        </p:spPr>
+        <p:style>
+          <a:lnRef idx="1">
+            <a:schemeClr val="accent6"/>
+          </a:lnRef>
+          <a:fillRef idx="2">
+            <a:schemeClr val="accent6"/>
+          </a:fillRef>
+          <a:effectRef idx="1">
+            <a:schemeClr val="accent6"/>
+          </a:effectRef>
+          <a:fontRef idx="minor">
+            <a:schemeClr val="dk1"/>
+          </a:fontRef>
+        </p:style>
+        <p:txBody>
+          <a:bodyPr rtlCol="0" anchor="ctr"/>
+          <a:lstStyle/>
+          <a:p>
+            <a:pPr algn="ctr"/>
+            <a:r>
+              <a:rPr lang="en-US" sz="2800" dirty="0" smtClean="0">
+                <a:solidFill>
+                  <a:schemeClr val="tx1"/>
+                </a:solidFill>
+              </a:rPr>
+              <a:t>Subiculum</a:t>
+            </a:r>
+            <a:endParaRPr lang="en-US" sz="2800" dirty="0">
+              <a:solidFill>
+                <a:schemeClr val="tx1"/>
+              </a:solidFill>
+            </a:endParaRPr>
+          </a:p>
+        </p:txBody>
+      </p:sp>
     </p:spTree>
     <p:extLst>
       <p:ext uri="{BB962C8B-B14F-4D97-AF65-F5344CB8AC3E}">
@@ -4549,20 +4668,588 @@
       </p:grpSpPr>
       <p:sp>
         <p:nvSpPr>
-          <p:cNvPr id="5" name="Parallelogramm 4"/>
+          <p:cNvPr id="38" name="Ellipse 37"/>
           <p:cNvSpPr/>
           <p:nvPr/>
         </p:nvSpPr>
         <p:spPr>
           <a:xfrm>
-            <a:off x="2566664" y="688635"/>
-            <a:ext cx="6920236" cy="2037027"/>
-          </a:xfrm>
-          <a:prstGeom prst="parallelogram">
-            <a:avLst>
-              <a:gd name="adj" fmla="val 76462"/>
-            </a:avLst>
-          </a:prstGeom>
+            <a:off x="4336543" y="4572000"/>
+            <a:ext cx="4195401" cy="1650150"/>
+          </a:xfrm>
+          <a:prstGeom prst="ellipse">
+            <a:avLst/>
+          </a:prstGeom>
+        </p:spPr>
+        <p:style>
+          <a:lnRef idx="1">
+            <a:schemeClr val="accent6"/>
+          </a:lnRef>
+          <a:fillRef idx="2">
+            <a:schemeClr val="accent6"/>
+          </a:fillRef>
+          <a:effectRef idx="1">
+            <a:schemeClr val="accent6"/>
+          </a:effectRef>
+          <a:fontRef idx="minor">
+            <a:schemeClr val="dk1"/>
+          </a:fontRef>
+        </p:style>
+        <p:txBody>
+          <a:bodyPr lIns="0" tIns="0" rIns="0" bIns="0" rtlCol="0" anchor="ctr"/>
+          <a:lstStyle/>
+          <a:p>
+            <a:pPr algn="ctr"/>
+            <a:endParaRPr lang="de-AT" sz="2400" dirty="0" smtClean="0"/>
+          </a:p>
+          <a:p>
+            <a:pPr algn="ctr"/>
+            <a:endParaRPr lang="de-AT" sz="2400" dirty="0"/>
+          </a:p>
+          <a:p>
+            <a:pPr algn="ctr"/>
+            <a:endParaRPr lang="de-AT" sz="2400" dirty="0" smtClean="0"/>
+          </a:p>
+          <a:p>
+            <a:pPr algn="ctr"/>
+            <a:r>
+              <a:rPr lang="de-AT" sz="2400" dirty="0" smtClean="0"/>
+              <a:t>L</a:t>
+            </a:r>
+            <a:endParaRPr lang="en-GB" sz="2400" baseline="-25000" dirty="0"/>
+          </a:p>
+        </p:txBody>
+      </p:sp>
+      <p:sp>
+        <p:nvSpPr>
+          <p:cNvPr id="4" name="Ellipse 3"/>
+          <p:cNvSpPr/>
+          <p:nvPr/>
+        </p:nvSpPr>
+        <p:spPr>
+          <a:xfrm>
+            <a:off x="3278038" y="2087592"/>
+            <a:ext cx="828136" cy="828136"/>
+          </a:xfrm>
+          <a:prstGeom prst="ellipse">
+            <a:avLst/>
+          </a:prstGeom>
+        </p:spPr>
+        <p:style>
+          <a:lnRef idx="2">
+            <a:schemeClr val="dk1"/>
+          </a:lnRef>
+          <a:fillRef idx="1">
+            <a:schemeClr val="lt1"/>
+          </a:fillRef>
+          <a:effectRef idx="0">
+            <a:schemeClr val="dk1"/>
+          </a:effectRef>
+          <a:fontRef idx="minor">
+            <a:schemeClr val="dk1"/>
+          </a:fontRef>
+        </p:style>
+        <p:txBody>
+          <a:bodyPr lIns="0" tIns="0" rIns="0" bIns="0" rtlCol="0" anchor="ctr"/>
+          <a:lstStyle/>
+          <a:p>
+            <a:pPr algn="ctr"/>
+            <a:r>
+              <a:rPr lang="de-AT" sz="2400" dirty="0" smtClean="0"/>
+              <a:t>x</a:t>
+            </a:r>
+            <a:r>
+              <a:rPr lang="de-AT" sz="2400" baseline="-25000" dirty="0" smtClean="0"/>
+              <a:t>t-1</a:t>
+            </a:r>
+            <a:endParaRPr lang="en-GB" sz="2400" baseline="-25000" dirty="0"/>
+          </a:p>
+        </p:txBody>
+      </p:sp>
+      <p:sp>
+        <p:nvSpPr>
+          <p:cNvPr id="5" name="Ellipse 4"/>
+          <p:cNvSpPr/>
+          <p:nvPr/>
+        </p:nvSpPr>
+        <p:spPr>
+          <a:xfrm>
+            <a:off x="5305420" y="2087592"/>
+            <a:ext cx="828136" cy="828136"/>
+          </a:xfrm>
+          <a:prstGeom prst="ellipse">
+            <a:avLst/>
+          </a:prstGeom>
+        </p:spPr>
+        <p:style>
+          <a:lnRef idx="2">
+            <a:schemeClr val="dk1"/>
+          </a:lnRef>
+          <a:fillRef idx="1">
+            <a:schemeClr val="lt1"/>
+          </a:fillRef>
+          <a:effectRef idx="0">
+            <a:schemeClr val="dk1"/>
+          </a:effectRef>
+          <a:fontRef idx="minor">
+            <a:schemeClr val="dk1"/>
+          </a:fontRef>
+        </p:style>
+        <p:txBody>
+          <a:bodyPr lIns="0" tIns="0" rIns="0" bIns="0" rtlCol="0" anchor="ctr"/>
+          <a:lstStyle/>
+          <a:p>
+            <a:pPr algn="ctr"/>
+            <a:r>
+              <a:rPr lang="de-AT" sz="2400" dirty="0" smtClean="0"/>
+              <a:t>x</a:t>
+            </a:r>
+            <a:r>
+              <a:rPr lang="de-AT" sz="2400" baseline="-25000" dirty="0" smtClean="0"/>
+              <a:t>t</a:t>
+            </a:r>
+            <a:endParaRPr lang="en-GB" sz="2400" baseline="-25000" dirty="0"/>
+          </a:p>
+        </p:txBody>
+      </p:sp>
+      <p:sp>
+        <p:nvSpPr>
+          <p:cNvPr id="6" name="Ellipse 5"/>
+          <p:cNvSpPr/>
+          <p:nvPr/>
+        </p:nvSpPr>
+        <p:spPr>
+          <a:xfrm>
+            <a:off x="7332802" y="2087592"/>
+            <a:ext cx="828136" cy="828136"/>
+          </a:xfrm>
+          <a:prstGeom prst="ellipse">
+            <a:avLst/>
+          </a:prstGeom>
+        </p:spPr>
+        <p:style>
+          <a:lnRef idx="2">
+            <a:schemeClr val="dk1"/>
+          </a:lnRef>
+          <a:fillRef idx="1">
+            <a:schemeClr val="lt1"/>
+          </a:fillRef>
+          <a:effectRef idx="0">
+            <a:schemeClr val="dk1"/>
+          </a:effectRef>
+          <a:fontRef idx="minor">
+            <a:schemeClr val="dk1"/>
+          </a:fontRef>
+        </p:style>
+        <p:txBody>
+          <a:bodyPr lIns="0" tIns="0" rIns="0" bIns="0" rtlCol="0" anchor="ctr"/>
+          <a:lstStyle/>
+          <a:p>
+            <a:pPr algn="ctr"/>
+            <a:r>
+              <a:rPr lang="de-AT" sz="2400" dirty="0" smtClean="0"/>
+              <a:t>x</a:t>
+            </a:r>
+            <a:r>
+              <a:rPr lang="de-AT" sz="2400" baseline="-25000" dirty="0" smtClean="0"/>
+              <a:t>t+1</a:t>
+            </a:r>
+            <a:endParaRPr lang="en-GB" sz="2400" baseline="-25000" dirty="0"/>
+          </a:p>
+        </p:txBody>
+      </p:sp>
+      <p:cxnSp>
+        <p:nvCxnSpPr>
+          <p:cNvPr id="8" name="Gerade Verbindung mit Pfeil 7"/>
+          <p:cNvCxnSpPr>
+            <a:stCxn id="4" idx="6"/>
+            <a:endCxn id="5" idx="2"/>
+          </p:cNvCxnSpPr>
+          <p:nvPr/>
+        </p:nvCxnSpPr>
+        <p:spPr>
+          <a:xfrm>
+            <a:off x="4106174" y="2501660"/>
+            <a:ext cx="1199246" cy="0"/>
+          </a:xfrm>
+          <a:prstGeom prst="straightConnector1">
+            <a:avLst/>
+          </a:prstGeom>
+          <a:ln w="38100">
+            <a:solidFill>
+              <a:schemeClr val="tx1"/>
+            </a:solidFill>
+            <a:tailEnd type="triangle"/>
+          </a:ln>
+        </p:spPr>
+        <p:style>
+          <a:lnRef idx="1">
+            <a:schemeClr val="accent1"/>
+          </a:lnRef>
+          <a:fillRef idx="0">
+            <a:schemeClr val="accent1"/>
+          </a:fillRef>
+          <a:effectRef idx="0">
+            <a:schemeClr val="accent1"/>
+          </a:effectRef>
+          <a:fontRef idx="minor">
+            <a:schemeClr val="tx1"/>
+          </a:fontRef>
+        </p:style>
+      </p:cxnSp>
+      <p:cxnSp>
+        <p:nvCxnSpPr>
+          <p:cNvPr id="9" name="Gerade Verbindung mit Pfeil 8"/>
+          <p:cNvCxnSpPr/>
+          <p:nvPr/>
+        </p:nvCxnSpPr>
+        <p:spPr>
+          <a:xfrm>
+            <a:off x="6133556" y="2504884"/>
+            <a:ext cx="1199246" cy="0"/>
+          </a:xfrm>
+          <a:prstGeom prst="straightConnector1">
+            <a:avLst/>
+          </a:prstGeom>
+          <a:ln w="38100">
+            <a:solidFill>
+              <a:schemeClr val="tx1"/>
+            </a:solidFill>
+            <a:tailEnd type="triangle"/>
+          </a:ln>
+        </p:spPr>
+        <p:style>
+          <a:lnRef idx="1">
+            <a:schemeClr val="accent1"/>
+          </a:lnRef>
+          <a:fillRef idx="0">
+            <a:schemeClr val="accent1"/>
+          </a:fillRef>
+          <a:effectRef idx="0">
+            <a:schemeClr val="accent1"/>
+          </a:effectRef>
+          <a:fontRef idx="minor">
+            <a:schemeClr val="tx1"/>
+          </a:fontRef>
+        </p:style>
+      </p:cxnSp>
+      <p:cxnSp>
+        <p:nvCxnSpPr>
+          <p:cNvPr id="10" name="Gerade Verbindung mit Pfeil 9"/>
+          <p:cNvCxnSpPr/>
+          <p:nvPr/>
+        </p:nvCxnSpPr>
+        <p:spPr>
+          <a:xfrm>
+            <a:off x="8160938" y="2480399"/>
+            <a:ext cx="371110" cy="21261"/>
+          </a:xfrm>
+          <a:prstGeom prst="straightConnector1">
+            <a:avLst/>
+          </a:prstGeom>
+          <a:ln w="38100">
+            <a:solidFill>
+              <a:schemeClr val="tx1"/>
+            </a:solidFill>
+            <a:tailEnd type="triangle"/>
+          </a:ln>
+        </p:spPr>
+        <p:style>
+          <a:lnRef idx="1">
+            <a:schemeClr val="accent1"/>
+          </a:lnRef>
+          <a:fillRef idx="0">
+            <a:schemeClr val="accent1"/>
+          </a:fillRef>
+          <a:effectRef idx="0">
+            <a:schemeClr val="accent1"/>
+          </a:effectRef>
+          <a:fontRef idx="minor">
+            <a:schemeClr val="tx1"/>
+          </a:fontRef>
+        </p:style>
+      </p:cxnSp>
+      <p:sp>
+        <p:nvSpPr>
+          <p:cNvPr id="12" name="Textfeld 11"/>
+          <p:cNvSpPr txBox="1"/>
+          <p:nvPr/>
+        </p:nvSpPr>
+        <p:spPr>
+          <a:xfrm>
+            <a:off x="8531944" y="2255438"/>
+            <a:ext cx="415498" cy="492443"/>
+          </a:xfrm>
+          <a:prstGeom prst="rect">
+            <a:avLst/>
+          </a:prstGeom>
+          <a:noFill/>
+        </p:spPr>
+        <p:txBody>
+          <a:bodyPr wrap="none" rtlCol="0">
+            <a:spAutoFit/>
+          </a:bodyPr>
+          <a:lstStyle/>
+          <a:p>
+            <a:r>
+              <a:rPr lang="de-AT" sz="2600" dirty="0" smtClean="0"/>
+              <a:t>…</a:t>
+            </a:r>
+            <a:endParaRPr lang="en-GB" sz="2600" dirty="0"/>
+          </a:p>
+        </p:txBody>
+      </p:sp>
+      <p:sp>
+        <p:nvSpPr>
+          <p:cNvPr id="13" name="Ellipse 12"/>
+          <p:cNvSpPr/>
+          <p:nvPr/>
+        </p:nvSpPr>
+        <p:spPr>
+          <a:xfrm>
+            <a:off x="3278038" y="845388"/>
+            <a:ext cx="828136" cy="828136"/>
+          </a:xfrm>
+          <a:prstGeom prst="ellipse">
+            <a:avLst/>
+          </a:prstGeom>
+          <a:solidFill>
+            <a:srgbClr val="00008B"/>
+          </a:solidFill>
+        </p:spPr>
+        <p:style>
+          <a:lnRef idx="1">
+            <a:schemeClr val="dk1"/>
+          </a:lnRef>
+          <a:fillRef idx="2">
+            <a:schemeClr val="dk1"/>
+          </a:fillRef>
+          <a:effectRef idx="1">
+            <a:schemeClr val="dk1"/>
+          </a:effectRef>
+          <a:fontRef idx="minor">
+            <a:schemeClr val="dk1"/>
+          </a:fontRef>
+        </p:style>
+        <p:txBody>
+          <a:bodyPr lIns="0" tIns="0" rIns="0" bIns="0" rtlCol="0" anchor="ctr"/>
+          <a:lstStyle/>
+          <a:p>
+            <a:pPr algn="ctr"/>
+            <a:r>
+              <a:rPr lang="de-AT" sz="2400" dirty="0" smtClean="0">
+                <a:solidFill>
+                  <a:schemeClr val="bg1"/>
+                </a:solidFill>
+              </a:rPr>
+              <a:t>m</a:t>
+            </a:r>
+            <a:r>
+              <a:rPr lang="de-AT" sz="2400" baseline="-25000" dirty="0" smtClean="0">
+                <a:solidFill>
+                  <a:schemeClr val="bg1"/>
+                </a:solidFill>
+              </a:rPr>
+              <a:t>t-1</a:t>
+            </a:r>
+            <a:endParaRPr lang="en-GB" sz="2400" baseline="-25000" dirty="0">
+              <a:solidFill>
+                <a:schemeClr val="bg1"/>
+              </a:solidFill>
+            </a:endParaRPr>
+          </a:p>
+        </p:txBody>
+      </p:sp>
+      <p:sp>
+        <p:nvSpPr>
+          <p:cNvPr id="14" name="Ellipse 13"/>
+          <p:cNvSpPr/>
+          <p:nvPr/>
+        </p:nvSpPr>
+        <p:spPr>
+          <a:xfrm>
+            <a:off x="5305420" y="845388"/>
+            <a:ext cx="828136" cy="828136"/>
+          </a:xfrm>
+          <a:prstGeom prst="ellipse">
+            <a:avLst/>
+          </a:prstGeom>
+          <a:solidFill>
+            <a:srgbClr val="00008B"/>
+          </a:solidFill>
+        </p:spPr>
+        <p:style>
+          <a:lnRef idx="1">
+            <a:schemeClr val="dk1"/>
+          </a:lnRef>
+          <a:fillRef idx="2">
+            <a:schemeClr val="dk1"/>
+          </a:fillRef>
+          <a:effectRef idx="1">
+            <a:schemeClr val="dk1"/>
+          </a:effectRef>
+          <a:fontRef idx="minor">
+            <a:schemeClr val="dk1"/>
+          </a:fontRef>
+        </p:style>
+        <p:txBody>
+          <a:bodyPr lIns="0" tIns="0" rIns="0" bIns="0" rtlCol="0" anchor="ctr"/>
+          <a:lstStyle/>
+          <a:p>
+            <a:pPr algn="ctr"/>
+            <a:r>
+              <a:rPr lang="de-AT" sz="2400" dirty="0" smtClean="0">
+                <a:solidFill>
+                  <a:schemeClr val="bg1"/>
+                </a:solidFill>
+              </a:rPr>
+              <a:t>m</a:t>
+            </a:r>
+            <a:r>
+              <a:rPr lang="de-AT" sz="2400" baseline="-25000" dirty="0" smtClean="0">
+                <a:solidFill>
+                  <a:schemeClr val="bg1"/>
+                </a:solidFill>
+              </a:rPr>
+              <a:t>t</a:t>
+            </a:r>
+            <a:endParaRPr lang="en-GB" sz="2400" baseline="-25000" dirty="0">
+              <a:solidFill>
+                <a:schemeClr val="bg1"/>
+              </a:solidFill>
+            </a:endParaRPr>
+          </a:p>
+        </p:txBody>
+      </p:sp>
+      <p:sp>
+        <p:nvSpPr>
+          <p:cNvPr id="15" name="Ellipse 14"/>
+          <p:cNvSpPr/>
+          <p:nvPr/>
+        </p:nvSpPr>
+        <p:spPr>
+          <a:xfrm>
+            <a:off x="7332802" y="845388"/>
+            <a:ext cx="828136" cy="828136"/>
+          </a:xfrm>
+          <a:prstGeom prst="ellipse">
+            <a:avLst/>
+          </a:prstGeom>
+          <a:solidFill>
+            <a:srgbClr val="00008B"/>
+          </a:solidFill>
+        </p:spPr>
+        <p:style>
+          <a:lnRef idx="1">
+            <a:schemeClr val="dk1"/>
+          </a:lnRef>
+          <a:fillRef idx="2">
+            <a:schemeClr val="dk1"/>
+          </a:fillRef>
+          <a:effectRef idx="1">
+            <a:schemeClr val="dk1"/>
+          </a:effectRef>
+          <a:fontRef idx="minor">
+            <a:schemeClr val="dk1"/>
+          </a:fontRef>
+        </p:style>
+        <p:txBody>
+          <a:bodyPr lIns="0" tIns="0" rIns="0" bIns="0" rtlCol="0" anchor="ctr"/>
+          <a:lstStyle/>
+          <a:p>
+            <a:pPr algn="ctr"/>
+            <a:r>
+              <a:rPr lang="de-AT" sz="2400" dirty="0" smtClean="0">
+                <a:solidFill>
+                  <a:schemeClr val="bg1"/>
+                </a:solidFill>
+              </a:rPr>
+              <a:t>m</a:t>
+            </a:r>
+            <a:r>
+              <a:rPr lang="de-AT" sz="2400" baseline="-25000" dirty="0" smtClean="0">
+                <a:solidFill>
+                  <a:schemeClr val="bg1"/>
+                </a:solidFill>
+              </a:rPr>
+              <a:t>t+1</a:t>
+            </a:r>
+            <a:endParaRPr lang="en-GB" sz="2400" baseline="-25000" dirty="0">
+              <a:solidFill>
+                <a:schemeClr val="bg1"/>
+              </a:solidFill>
+            </a:endParaRPr>
+          </a:p>
+        </p:txBody>
+      </p:sp>
+      <p:sp>
+        <p:nvSpPr>
+          <p:cNvPr id="16" name="Ellipse 15"/>
+          <p:cNvSpPr/>
+          <p:nvPr/>
+        </p:nvSpPr>
+        <p:spPr>
+          <a:xfrm>
+            <a:off x="3278038" y="3329796"/>
+            <a:ext cx="828136" cy="828136"/>
+          </a:xfrm>
+          <a:prstGeom prst="ellipse">
+            <a:avLst/>
+          </a:prstGeom>
+        </p:spPr>
+        <p:style>
+          <a:lnRef idx="1">
+            <a:schemeClr val="accent6"/>
+          </a:lnRef>
+          <a:fillRef idx="2">
+            <a:schemeClr val="accent6"/>
+          </a:fillRef>
+          <a:effectRef idx="1">
+            <a:schemeClr val="accent6"/>
+          </a:effectRef>
+          <a:fontRef idx="minor">
+            <a:schemeClr val="dk1"/>
+          </a:fontRef>
+        </p:style>
+        <p:txBody>
+          <a:bodyPr lIns="0" tIns="0" rIns="0" bIns="0" rtlCol="0" anchor="ctr"/>
+          <a:lstStyle/>
+          <a:p>
+            <a:pPr algn="ctr"/>
+            <a:r>
+              <a:rPr lang="de-AT" sz="2400" dirty="0" smtClean="0"/>
+              <a:t>O</a:t>
+            </a:r>
+            <a:r>
+              <a:rPr lang="de-AT" sz="2400" baseline="-25000" dirty="0" smtClean="0"/>
+              <a:t>t-1</a:t>
+            </a:r>
+            <a:endParaRPr lang="en-GB" sz="2400" baseline="-25000" dirty="0"/>
+          </a:p>
+        </p:txBody>
+      </p:sp>
+      <p:sp>
+        <p:nvSpPr>
+          <p:cNvPr id="17" name="Ellipse 16"/>
+          <p:cNvSpPr/>
+          <p:nvPr/>
+        </p:nvSpPr>
+        <p:spPr>
+          <a:xfrm>
+            <a:off x="5305420" y="3329796"/>
+            <a:ext cx="828136" cy="828136"/>
+          </a:xfrm>
+          <a:prstGeom prst="ellipse">
+            <a:avLst/>
+          </a:prstGeom>
+          <a:solidFill>
+            <a:srgbClr val="006600"/>
+          </a:solidFill>
+          <a:ln>
+            <a:solidFill>
+              <a:srgbClr val="006600"/>
+            </a:solidFill>
+          </a:ln>
         </p:spPr>
         <p:style>
           <a:lnRef idx="2">
@@ -4581,6 +5268,1031 @@
           </a:fontRef>
         </p:style>
         <p:txBody>
+          <a:bodyPr lIns="0" tIns="0" rIns="0" bIns="0" rtlCol="0" anchor="ctr"/>
+          <a:lstStyle/>
+          <a:p>
+            <a:pPr algn="ctr"/>
+            <a:r>
+              <a:rPr lang="de-AT" sz="2400" dirty="0" smtClean="0"/>
+              <a:t>O</a:t>
+            </a:r>
+            <a:r>
+              <a:rPr lang="de-AT" sz="2400" baseline="-25000" dirty="0" smtClean="0"/>
+              <a:t>t</a:t>
+            </a:r>
+            <a:endParaRPr lang="en-GB" sz="2400" baseline="-25000" dirty="0"/>
+          </a:p>
+        </p:txBody>
+      </p:sp>
+      <p:sp>
+        <p:nvSpPr>
+          <p:cNvPr id="18" name="Ellipse 17"/>
+          <p:cNvSpPr/>
+          <p:nvPr/>
+        </p:nvSpPr>
+        <p:spPr>
+          <a:xfrm>
+            <a:off x="7332802" y="3329796"/>
+            <a:ext cx="828136" cy="828136"/>
+          </a:xfrm>
+          <a:prstGeom prst="ellipse">
+            <a:avLst/>
+          </a:prstGeom>
+        </p:spPr>
+        <p:style>
+          <a:lnRef idx="1">
+            <a:schemeClr val="accent6"/>
+          </a:lnRef>
+          <a:fillRef idx="2">
+            <a:schemeClr val="accent6"/>
+          </a:fillRef>
+          <a:effectRef idx="1">
+            <a:schemeClr val="accent6"/>
+          </a:effectRef>
+          <a:fontRef idx="minor">
+            <a:schemeClr val="dk1"/>
+          </a:fontRef>
+        </p:style>
+        <p:txBody>
+          <a:bodyPr lIns="0" tIns="0" rIns="0" bIns="0" rtlCol="0" anchor="ctr"/>
+          <a:lstStyle/>
+          <a:p>
+            <a:pPr algn="ctr"/>
+            <a:r>
+              <a:rPr lang="de-AT" sz="2400" dirty="0" smtClean="0"/>
+              <a:t>O</a:t>
+            </a:r>
+            <a:r>
+              <a:rPr lang="de-AT" sz="2400" baseline="-25000" dirty="0" smtClean="0"/>
+              <a:t>t+1</a:t>
+            </a:r>
+            <a:endParaRPr lang="en-GB" sz="2400" baseline="-25000" dirty="0"/>
+          </a:p>
+        </p:txBody>
+      </p:sp>
+      <p:cxnSp>
+        <p:nvCxnSpPr>
+          <p:cNvPr id="19" name="Gerade Verbindung mit Pfeil 18"/>
+          <p:cNvCxnSpPr>
+            <a:stCxn id="13" idx="4"/>
+            <a:endCxn id="4" idx="0"/>
+          </p:cNvCxnSpPr>
+          <p:nvPr/>
+        </p:nvCxnSpPr>
+        <p:spPr>
+          <a:xfrm>
+            <a:off x="3692106" y="1673524"/>
+            <a:ext cx="0" cy="414068"/>
+          </a:xfrm>
+          <a:prstGeom prst="straightConnector1">
+            <a:avLst/>
+          </a:prstGeom>
+          <a:ln w="38100">
+            <a:solidFill>
+              <a:schemeClr val="tx1"/>
+            </a:solidFill>
+            <a:tailEnd type="triangle"/>
+          </a:ln>
+        </p:spPr>
+        <p:style>
+          <a:lnRef idx="1">
+            <a:schemeClr val="accent1"/>
+          </a:lnRef>
+          <a:fillRef idx="0">
+            <a:schemeClr val="accent1"/>
+          </a:fillRef>
+          <a:effectRef idx="0">
+            <a:schemeClr val="accent1"/>
+          </a:effectRef>
+          <a:fontRef idx="minor">
+            <a:schemeClr val="tx1"/>
+          </a:fontRef>
+        </p:style>
+      </p:cxnSp>
+      <p:cxnSp>
+        <p:nvCxnSpPr>
+          <p:cNvPr id="22" name="Gerade Verbindung mit Pfeil 21"/>
+          <p:cNvCxnSpPr/>
+          <p:nvPr/>
+        </p:nvCxnSpPr>
+        <p:spPr>
+          <a:xfrm>
+            <a:off x="5728724" y="1673524"/>
+            <a:ext cx="0" cy="414068"/>
+          </a:xfrm>
+          <a:prstGeom prst="straightConnector1">
+            <a:avLst/>
+          </a:prstGeom>
+          <a:ln w="38100">
+            <a:solidFill>
+              <a:schemeClr val="tx1"/>
+            </a:solidFill>
+            <a:tailEnd type="triangle"/>
+          </a:ln>
+        </p:spPr>
+        <p:style>
+          <a:lnRef idx="1">
+            <a:schemeClr val="accent1"/>
+          </a:lnRef>
+          <a:fillRef idx="0">
+            <a:schemeClr val="accent1"/>
+          </a:fillRef>
+          <a:effectRef idx="0">
+            <a:schemeClr val="accent1"/>
+          </a:effectRef>
+          <a:fontRef idx="minor">
+            <a:schemeClr val="tx1"/>
+          </a:fontRef>
+        </p:style>
+      </p:cxnSp>
+      <p:cxnSp>
+        <p:nvCxnSpPr>
+          <p:cNvPr id="23" name="Gerade Verbindung mit Pfeil 22"/>
+          <p:cNvCxnSpPr/>
+          <p:nvPr/>
+        </p:nvCxnSpPr>
+        <p:spPr>
+          <a:xfrm>
+            <a:off x="7756106" y="1673524"/>
+            <a:ext cx="0" cy="414068"/>
+          </a:xfrm>
+          <a:prstGeom prst="straightConnector1">
+            <a:avLst/>
+          </a:prstGeom>
+          <a:ln w="38100">
+            <a:solidFill>
+              <a:schemeClr val="tx1"/>
+            </a:solidFill>
+            <a:tailEnd type="triangle"/>
+          </a:ln>
+        </p:spPr>
+        <p:style>
+          <a:lnRef idx="1">
+            <a:schemeClr val="accent1"/>
+          </a:lnRef>
+          <a:fillRef idx="0">
+            <a:schemeClr val="accent1"/>
+          </a:fillRef>
+          <a:effectRef idx="0">
+            <a:schemeClr val="accent1"/>
+          </a:effectRef>
+          <a:fontRef idx="minor">
+            <a:schemeClr val="tx1"/>
+          </a:fontRef>
+        </p:style>
+      </p:cxnSp>
+      <p:cxnSp>
+        <p:nvCxnSpPr>
+          <p:cNvPr id="24" name="Gerade Verbindung mit Pfeil 23"/>
+          <p:cNvCxnSpPr>
+            <a:stCxn id="16" idx="0"/>
+            <a:endCxn id="4" idx="4"/>
+          </p:cNvCxnSpPr>
+          <p:nvPr/>
+        </p:nvCxnSpPr>
+        <p:spPr>
+          <a:xfrm flipV="1">
+            <a:off x="3692106" y="2915728"/>
+            <a:ext cx="0" cy="414068"/>
+          </a:xfrm>
+          <a:prstGeom prst="straightConnector1">
+            <a:avLst/>
+          </a:prstGeom>
+          <a:ln w="38100">
+            <a:solidFill>
+              <a:schemeClr val="tx1"/>
+            </a:solidFill>
+            <a:tailEnd type="triangle"/>
+          </a:ln>
+        </p:spPr>
+        <p:style>
+          <a:lnRef idx="1">
+            <a:schemeClr val="accent1"/>
+          </a:lnRef>
+          <a:fillRef idx="0">
+            <a:schemeClr val="accent1"/>
+          </a:fillRef>
+          <a:effectRef idx="0">
+            <a:schemeClr val="accent1"/>
+          </a:effectRef>
+          <a:fontRef idx="minor">
+            <a:schemeClr val="tx1"/>
+          </a:fontRef>
+        </p:style>
+      </p:cxnSp>
+      <p:cxnSp>
+        <p:nvCxnSpPr>
+          <p:cNvPr id="27" name="Gerade Verbindung mit Pfeil 26"/>
+          <p:cNvCxnSpPr/>
+          <p:nvPr/>
+        </p:nvCxnSpPr>
+        <p:spPr>
+          <a:xfrm flipV="1">
+            <a:off x="5719488" y="2915728"/>
+            <a:ext cx="0" cy="414068"/>
+          </a:xfrm>
+          <a:prstGeom prst="straightConnector1">
+            <a:avLst/>
+          </a:prstGeom>
+          <a:ln w="38100">
+            <a:solidFill>
+              <a:schemeClr val="tx1"/>
+            </a:solidFill>
+            <a:tailEnd type="triangle"/>
+          </a:ln>
+        </p:spPr>
+        <p:style>
+          <a:lnRef idx="1">
+            <a:schemeClr val="accent1"/>
+          </a:lnRef>
+          <a:fillRef idx="0">
+            <a:schemeClr val="accent1"/>
+          </a:fillRef>
+          <a:effectRef idx="0">
+            <a:schemeClr val="accent1"/>
+          </a:effectRef>
+          <a:fontRef idx="minor">
+            <a:schemeClr val="tx1"/>
+          </a:fontRef>
+        </p:style>
+      </p:cxnSp>
+      <p:cxnSp>
+        <p:nvCxnSpPr>
+          <p:cNvPr id="28" name="Gerade Verbindung mit Pfeil 27"/>
+          <p:cNvCxnSpPr/>
+          <p:nvPr/>
+        </p:nvCxnSpPr>
+        <p:spPr>
+          <a:xfrm flipV="1">
+            <a:off x="7756106" y="2915728"/>
+            <a:ext cx="0" cy="414068"/>
+          </a:xfrm>
+          <a:prstGeom prst="straightConnector1">
+            <a:avLst/>
+          </a:prstGeom>
+          <a:ln w="38100">
+            <a:solidFill>
+              <a:schemeClr val="tx1"/>
+            </a:solidFill>
+            <a:tailEnd type="triangle"/>
+          </a:ln>
+        </p:spPr>
+        <p:style>
+          <a:lnRef idx="1">
+            <a:schemeClr val="accent1"/>
+          </a:lnRef>
+          <a:fillRef idx="0">
+            <a:schemeClr val="accent1"/>
+          </a:fillRef>
+          <a:effectRef idx="0">
+            <a:schemeClr val="accent1"/>
+          </a:effectRef>
+          <a:fontRef idx="minor">
+            <a:schemeClr val="tx1"/>
+          </a:fontRef>
+        </p:style>
+      </p:cxnSp>
+      <p:sp>
+        <p:nvSpPr>
+          <p:cNvPr id="29" name="Ellipse 28"/>
+          <p:cNvSpPr/>
+          <p:nvPr/>
+        </p:nvSpPr>
+        <p:spPr>
+          <a:xfrm>
+            <a:off x="4831017" y="4864403"/>
+            <a:ext cx="828136" cy="828136"/>
+          </a:xfrm>
+          <a:prstGeom prst="ellipse">
+            <a:avLst/>
+          </a:prstGeom>
+        </p:spPr>
+        <p:style>
+          <a:lnRef idx="1">
+            <a:schemeClr val="accent6"/>
+          </a:lnRef>
+          <a:fillRef idx="2">
+            <a:schemeClr val="accent6"/>
+          </a:fillRef>
+          <a:effectRef idx="1">
+            <a:schemeClr val="accent6"/>
+          </a:effectRef>
+          <a:fontRef idx="minor">
+            <a:schemeClr val="dk1"/>
+          </a:fontRef>
+        </p:style>
+        <p:txBody>
+          <a:bodyPr lIns="0" tIns="0" rIns="0" bIns="0" rtlCol="0" anchor="ctr"/>
+          <a:lstStyle/>
+          <a:p>
+            <a:pPr algn="ctr"/>
+            <a:r>
+              <a:rPr lang="de-AT" sz="2400" dirty="0" smtClean="0"/>
+              <a:t>l</a:t>
+            </a:r>
+            <a:r>
+              <a:rPr lang="de-AT" sz="2400" baseline="-25000" dirty="0" smtClean="0"/>
+              <a:t>1</a:t>
+            </a:r>
+            <a:endParaRPr lang="en-GB" sz="2400" baseline="-25000" dirty="0"/>
+          </a:p>
+        </p:txBody>
+      </p:sp>
+      <p:sp>
+        <p:nvSpPr>
+          <p:cNvPr id="30" name="Ellipse 29"/>
+          <p:cNvSpPr/>
+          <p:nvPr/>
+        </p:nvSpPr>
+        <p:spPr>
+          <a:xfrm>
+            <a:off x="5748889" y="4864403"/>
+            <a:ext cx="828136" cy="828136"/>
+          </a:xfrm>
+          <a:prstGeom prst="ellipse">
+            <a:avLst/>
+          </a:prstGeom>
+        </p:spPr>
+        <p:style>
+          <a:lnRef idx="1">
+            <a:schemeClr val="accent6"/>
+          </a:lnRef>
+          <a:fillRef idx="2">
+            <a:schemeClr val="accent6"/>
+          </a:fillRef>
+          <a:effectRef idx="1">
+            <a:schemeClr val="accent6"/>
+          </a:effectRef>
+          <a:fontRef idx="minor">
+            <a:schemeClr val="dk1"/>
+          </a:fontRef>
+        </p:style>
+        <p:txBody>
+          <a:bodyPr lIns="0" tIns="0" rIns="0" bIns="0" rtlCol="0" anchor="ctr"/>
+          <a:lstStyle/>
+          <a:p>
+            <a:pPr algn="ctr"/>
+            <a:r>
+              <a:rPr lang="de-AT" sz="2400" dirty="0" smtClean="0"/>
+              <a:t>l</a:t>
+            </a:r>
+            <a:r>
+              <a:rPr lang="de-AT" sz="2400" baseline="-25000" dirty="0"/>
+              <a:t>2</a:t>
+            </a:r>
+            <a:endParaRPr lang="en-GB" sz="2400" baseline="-25000" dirty="0"/>
+          </a:p>
+        </p:txBody>
+      </p:sp>
+      <p:sp>
+        <p:nvSpPr>
+          <p:cNvPr id="31" name="Textfeld 30"/>
+          <p:cNvSpPr txBox="1"/>
+          <p:nvPr/>
+        </p:nvSpPr>
+        <p:spPr>
+          <a:xfrm>
+            <a:off x="6771816" y="5032249"/>
+            <a:ext cx="415498" cy="492443"/>
+          </a:xfrm>
+          <a:prstGeom prst="rect">
+            <a:avLst/>
+          </a:prstGeom>
+          <a:noFill/>
+        </p:spPr>
+        <p:txBody>
+          <a:bodyPr wrap="none" rtlCol="0">
+            <a:spAutoFit/>
+          </a:bodyPr>
+          <a:lstStyle/>
+          <a:p>
+            <a:r>
+              <a:rPr lang="de-AT" sz="2600" dirty="0" smtClean="0"/>
+              <a:t>…</a:t>
+            </a:r>
+            <a:endParaRPr lang="en-GB" sz="2600" dirty="0"/>
+          </a:p>
+        </p:txBody>
+      </p:sp>
+      <p:sp>
+        <p:nvSpPr>
+          <p:cNvPr id="32" name="Ellipse 31"/>
+          <p:cNvSpPr/>
+          <p:nvPr/>
+        </p:nvSpPr>
+        <p:spPr>
+          <a:xfrm>
+            <a:off x="7268798" y="4864403"/>
+            <a:ext cx="828136" cy="828136"/>
+          </a:xfrm>
+          <a:prstGeom prst="ellipse">
+            <a:avLst/>
+          </a:prstGeom>
+        </p:spPr>
+        <p:style>
+          <a:lnRef idx="1">
+            <a:schemeClr val="accent6"/>
+          </a:lnRef>
+          <a:fillRef idx="2">
+            <a:schemeClr val="accent6"/>
+          </a:fillRef>
+          <a:effectRef idx="1">
+            <a:schemeClr val="accent6"/>
+          </a:effectRef>
+          <a:fontRef idx="minor">
+            <a:schemeClr val="dk1"/>
+          </a:fontRef>
+        </p:style>
+        <p:txBody>
+          <a:bodyPr lIns="0" tIns="0" rIns="0" bIns="0" rtlCol="0" anchor="ctr"/>
+          <a:lstStyle/>
+          <a:p>
+            <a:pPr algn="ctr"/>
+            <a:r>
+              <a:rPr lang="de-AT" sz="2400" dirty="0" smtClean="0"/>
+              <a:t>l</a:t>
+            </a:r>
+            <a:r>
+              <a:rPr lang="de-AT" sz="2400" baseline="-25000" dirty="0" smtClean="0"/>
+              <a:t>N</a:t>
+            </a:r>
+            <a:endParaRPr lang="en-GB" sz="2400" baseline="-25000" dirty="0"/>
+          </a:p>
+        </p:txBody>
+      </p:sp>
+      <p:sp>
+        <p:nvSpPr>
+          <p:cNvPr id="33" name="Ellipse 32"/>
+          <p:cNvSpPr/>
+          <p:nvPr/>
+        </p:nvSpPr>
+        <p:spPr>
+          <a:xfrm>
+            <a:off x="9369420" y="2087592"/>
+            <a:ext cx="828136" cy="828136"/>
+          </a:xfrm>
+          <a:prstGeom prst="ellipse">
+            <a:avLst/>
+          </a:prstGeom>
+        </p:spPr>
+        <p:style>
+          <a:lnRef idx="2">
+            <a:schemeClr val="dk1"/>
+          </a:lnRef>
+          <a:fillRef idx="1">
+            <a:schemeClr val="lt1"/>
+          </a:fillRef>
+          <a:effectRef idx="0">
+            <a:schemeClr val="dk1"/>
+          </a:effectRef>
+          <a:fontRef idx="minor">
+            <a:schemeClr val="dk1"/>
+          </a:fontRef>
+        </p:style>
+        <p:txBody>
+          <a:bodyPr lIns="0" tIns="0" rIns="0" bIns="0" rtlCol="0" anchor="ctr"/>
+          <a:lstStyle/>
+          <a:p>
+            <a:pPr algn="ctr"/>
+            <a:r>
+              <a:rPr lang="de-AT" sz="2400" dirty="0" smtClean="0"/>
+              <a:t>x</a:t>
+            </a:r>
+            <a:r>
+              <a:rPr lang="de-AT" sz="2400" baseline="-25000" dirty="0" smtClean="0"/>
+              <a:t>T</a:t>
+            </a:r>
+            <a:endParaRPr lang="en-GB" sz="2400" baseline="-25000" dirty="0"/>
+          </a:p>
+        </p:txBody>
+      </p:sp>
+      <p:sp>
+        <p:nvSpPr>
+          <p:cNvPr id="34" name="Ellipse 33"/>
+          <p:cNvSpPr/>
+          <p:nvPr/>
+        </p:nvSpPr>
+        <p:spPr>
+          <a:xfrm>
+            <a:off x="9369420" y="845388"/>
+            <a:ext cx="828136" cy="828136"/>
+          </a:xfrm>
+          <a:prstGeom prst="ellipse">
+            <a:avLst/>
+          </a:prstGeom>
+          <a:solidFill>
+            <a:srgbClr val="00008B"/>
+          </a:solidFill>
+        </p:spPr>
+        <p:style>
+          <a:lnRef idx="1">
+            <a:schemeClr val="dk1"/>
+          </a:lnRef>
+          <a:fillRef idx="2">
+            <a:schemeClr val="dk1"/>
+          </a:fillRef>
+          <a:effectRef idx="1">
+            <a:schemeClr val="dk1"/>
+          </a:effectRef>
+          <a:fontRef idx="minor">
+            <a:schemeClr val="dk1"/>
+          </a:fontRef>
+        </p:style>
+        <p:txBody>
+          <a:bodyPr lIns="0" tIns="0" rIns="0" bIns="0" rtlCol="0" anchor="ctr"/>
+          <a:lstStyle/>
+          <a:p>
+            <a:pPr algn="ctr"/>
+            <a:r>
+              <a:rPr lang="de-AT" sz="2400" dirty="0" smtClean="0">
+                <a:solidFill>
+                  <a:schemeClr val="bg1"/>
+                </a:solidFill>
+              </a:rPr>
+              <a:t>m</a:t>
+            </a:r>
+            <a:r>
+              <a:rPr lang="de-AT" sz="2400" baseline="-25000" dirty="0">
+                <a:solidFill>
+                  <a:schemeClr val="bg1"/>
+                </a:solidFill>
+              </a:rPr>
+              <a:t>T</a:t>
+            </a:r>
+            <a:endParaRPr lang="en-GB" sz="2400" baseline="-25000" dirty="0">
+              <a:solidFill>
+                <a:schemeClr val="bg1"/>
+              </a:solidFill>
+            </a:endParaRPr>
+          </a:p>
+        </p:txBody>
+      </p:sp>
+      <p:sp>
+        <p:nvSpPr>
+          <p:cNvPr id="35" name="Ellipse 34"/>
+          <p:cNvSpPr/>
+          <p:nvPr/>
+        </p:nvSpPr>
+        <p:spPr>
+          <a:xfrm>
+            <a:off x="9369420" y="3329796"/>
+            <a:ext cx="828136" cy="828136"/>
+          </a:xfrm>
+          <a:prstGeom prst="ellipse">
+            <a:avLst/>
+          </a:prstGeom>
+          <a:solidFill>
+            <a:srgbClr val="006600"/>
+          </a:solidFill>
+          <a:ln>
+            <a:solidFill>
+              <a:srgbClr val="006600"/>
+            </a:solidFill>
+          </a:ln>
+        </p:spPr>
+        <p:style>
+          <a:lnRef idx="2">
+            <a:schemeClr val="accent6">
+              <a:shade val="50000"/>
+            </a:schemeClr>
+          </a:lnRef>
+          <a:fillRef idx="1">
+            <a:schemeClr val="accent6"/>
+          </a:fillRef>
+          <a:effectRef idx="0">
+            <a:schemeClr val="accent6"/>
+          </a:effectRef>
+          <a:fontRef idx="minor">
+            <a:schemeClr val="lt1"/>
+          </a:fontRef>
+        </p:style>
+        <p:txBody>
+          <a:bodyPr lIns="0" tIns="0" rIns="0" bIns="0" rtlCol="0" anchor="ctr"/>
+          <a:lstStyle/>
+          <a:p>
+            <a:pPr algn="ctr"/>
+            <a:r>
+              <a:rPr lang="de-AT" sz="2400" dirty="0" smtClean="0"/>
+              <a:t>O</a:t>
+            </a:r>
+            <a:r>
+              <a:rPr lang="de-AT" sz="2400" baseline="-25000" dirty="0"/>
+              <a:t>T</a:t>
+            </a:r>
+            <a:endParaRPr lang="en-GB" sz="2400" baseline="-25000" dirty="0"/>
+          </a:p>
+        </p:txBody>
+      </p:sp>
+      <p:cxnSp>
+        <p:nvCxnSpPr>
+          <p:cNvPr id="37" name="Gerade Verbindung mit Pfeil 36"/>
+          <p:cNvCxnSpPr/>
+          <p:nvPr/>
+        </p:nvCxnSpPr>
+        <p:spPr>
+          <a:xfrm>
+            <a:off x="8998310" y="2501659"/>
+            <a:ext cx="371110" cy="21261"/>
+          </a:xfrm>
+          <a:prstGeom prst="straightConnector1">
+            <a:avLst/>
+          </a:prstGeom>
+          <a:ln w="38100">
+            <a:solidFill>
+              <a:schemeClr val="tx1"/>
+            </a:solidFill>
+            <a:tailEnd type="triangle"/>
+          </a:ln>
+        </p:spPr>
+        <p:style>
+          <a:lnRef idx="1">
+            <a:schemeClr val="accent1"/>
+          </a:lnRef>
+          <a:fillRef idx="0">
+            <a:schemeClr val="accent1"/>
+          </a:fillRef>
+          <a:effectRef idx="0">
+            <a:schemeClr val="accent1"/>
+          </a:effectRef>
+          <a:fontRef idx="minor">
+            <a:schemeClr val="tx1"/>
+          </a:fontRef>
+        </p:style>
+      </p:cxnSp>
+      <p:cxnSp>
+        <p:nvCxnSpPr>
+          <p:cNvPr id="39" name="Gerade Verbindung mit Pfeil 38"/>
+          <p:cNvCxnSpPr>
+            <a:endCxn id="16" idx="4"/>
+          </p:cNvCxnSpPr>
+          <p:nvPr/>
+        </p:nvCxnSpPr>
+        <p:spPr>
+          <a:xfrm flipH="1" flipV="1">
+            <a:off x="3692106" y="4157932"/>
+            <a:ext cx="889352" cy="874317"/>
+          </a:xfrm>
+          <a:prstGeom prst="straightConnector1">
+            <a:avLst/>
+          </a:prstGeom>
+          <a:ln w="38100">
+            <a:solidFill>
+              <a:schemeClr val="tx1"/>
+            </a:solidFill>
+            <a:tailEnd type="triangle"/>
+          </a:ln>
+        </p:spPr>
+        <p:style>
+          <a:lnRef idx="1">
+            <a:schemeClr val="accent1"/>
+          </a:lnRef>
+          <a:fillRef idx="0">
+            <a:schemeClr val="accent1"/>
+          </a:fillRef>
+          <a:effectRef idx="0">
+            <a:schemeClr val="accent1"/>
+          </a:effectRef>
+          <a:fontRef idx="minor">
+            <a:schemeClr val="tx1"/>
+          </a:fontRef>
+        </p:style>
+      </p:cxnSp>
+      <p:cxnSp>
+        <p:nvCxnSpPr>
+          <p:cNvPr id="42" name="Gerade Verbindung mit Pfeil 41"/>
+          <p:cNvCxnSpPr>
+            <a:endCxn id="17" idx="4"/>
+          </p:cNvCxnSpPr>
+          <p:nvPr/>
+        </p:nvCxnSpPr>
+        <p:spPr>
+          <a:xfrm flipH="1" flipV="1">
+            <a:off x="5719488" y="4157932"/>
+            <a:ext cx="9236" cy="437158"/>
+          </a:xfrm>
+          <a:prstGeom prst="straightConnector1">
+            <a:avLst/>
+          </a:prstGeom>
+          <a:ln w="38100">
+            <a:solidFill>
+              <a:schemeClr val="tx1"/>
+            </a:solidFill>
+            <a:tailEnd type="triangle"/>
+          </a:ln>
+        </p:spPr>
+        <p:style>
+          <a:lnRef idx="1">
+            <a:schemeClr val="accent1"/>
+          </a:lnRef>
+          <a:fillRef idx="0">
+            <a:schemeClr val="accent1"/>
+          </a:fillRef>
+          <a:effectRef idx="0">
+            <a:schemeClr val="accent1"/>
+          </a:effectRef>
+          <a:fontRef idx="minor">
+            <a:schemeClr val="tx1"/>
+          </a:fontRef>
+        </p:style>
+      </p:cxnSp>
+      <p:cxnSp>
+        <p:nvCxnSpPr>
+          <p:cNvPr id="45" name="Gerade Verbindung mit Pfeil 44"/>
+          <p:cNvCxnSpPr>
+            <a:endCxn id="35" idx="3"/>
+          </p:cNvCxnSpPr>
+          <p:nvPr/>
+        </p:nvCxnSpPr>
+        <p:spPr>
+          <a:xfrm flipV="1">
+            <a:off x="8346493" y="4036654"/>
+            <a:ext cx="1144205" cy="995595"/>
+          </a:xfrm>
+          <a:prstGeom prst="straightConnector1">
+            <a:avLst/>
+          </a:prstGeom>
+          <a:ln w="38100">
+            <a:solidFill>
+              <a:schemeClr val="tx1"/>
+            </a:solidFill>
+            <a:tailEnd type="triangle"/>
+          </a:ln>
+        </p:spPr>
+        <p:style>
+          <a:lnRef idx="1">
+            <a:schemeClr val="accent1"/>
+          </a:lnRef>
+          <a:fillRef idx="0">
+            <a:schemeClr val="accent1"/>
+          </a:fillRef>
+          <a:effectRef idx="0">
+            <a:schemeClr val="accent1"/>
+          </a:effectRef>
+          <a:fontRef idx="minor">
+            <a:schemeClr val="tx1"/>
+          </a:fontRef>
+        </p:style>
+      </p:cxnSp>
+      <p:cxnSp>
+        <p:nvCxnSpPr>
+          <p:cNvPr id="52" name="Gerade Verbindung mit Pfeil 51"/>
+          <p:cNvCxnSpPr/>
+          <p:nvPr/>
+        </p:nvCxnSpPr>
+        <p:spPr>
+          <a:xfrm flipV="1">
+            <a:off x="7583055" y="4158321"/>
+            <a:ext cx="194092" cy="581526"/>
+          </a:xfrm>
+          <a:prstGeom prst="straightConnector1">
+            <a:avLst/>
+          </a:prstGeom>
+          <a:ln w="38100">
+            <a:solidFill>
+              <a:schemeClr val="tx1"/>
+            </a:solidFill>
+            <a:tailEnd type="triangle"/>
+          </a:ln>
+        </p:spPr>
+        <p:style>
+          <a:lnRef idx="1">
+            <a:schemeClr val="accent1"/>
+          </a:lnRef>
+          <a:fillRef idx="0">
+            <a:schemeClr val="accent1"/>
+          </a:fillRef>
+          <a:effectRef idx="0">
+            <a:schemeClr val="accent1"/>
+          </a:effectRef>
+          <a:fontRef idx="minor">
+            <a:schemeClr val="tx1"/>
+          </a:fontRef>
+        </p:style>
+      </p:cxnSp>
+      <p:cxnSp>
+        <p:nvCxnSpPr>
+          <p:cNvPr id="66" name="Gerade Verbindung mit Pfeil 65"/>
+          <p:cNvCxnSpPr/>
+          <p:nvPr/>
+        </p:nvCxnSpPr>
+        <p:spPr>
+          <a:xfrm>
+            <a:off x="9785667" y="1673524"/>
+            <a:ext cx="0" cy="414068"/>
+          </a:xfrm>
+          <a:prstGeom prst="straightConnector1">
+            <a:avLst/>
+          </a:prstGeom>
+          <a:ln w="38100">
+            <a:solidFill>
+              <a:schemeClr val="tx1"/>
+            </a:solidFill>
+            <a:tailEnd type="triangle"/>
+          </a:ln>
+        </p:spPr>
+        <p:style>
+          <a:lnRef idx="1">
+            <a:schemeClr val="accent1"/>
+          </a:lnRef>
+          <a:fillRef idx="0">
+            <a:schemeClr val="accent1"/>
+          </a:fillRef>
+          <a:effectRef idx="0">
+            <a:schemeClr val="accent1"/>
+          </a:effectRef>
+          <a:fontRef idx="minor">
+            <a:schemeClr val="tx1"/>
+          </a:fontRef>
+        </p:style>
+      </p:cxnSp>
+      <p:cxnSp>
+        <p:nvCxnSpPr>
+          <p:cNvPr id="67" name="Gerade Verbindung mit Pfeil 66"/>
+          <p:cNvCxnSpPr/>
+          <p:nvPr/>
+        </p:nvCxnSpPr>
+        <p:spPr>
+          <a:xfrm flipV="1">
+            <a:off x="9785667" y="2915728"/>
+            <a:ext cx="0" cy="414068"/>
+          </a:xfrm>
+          <a:prstGeom prst="straightConnector1">
+            <a:avLst/>
+          </a:prstGeom>
+          <a:ln w="38100">
+            <a:solidFill>
+              <a:schemeClr val="tx1"/>
+            </a:solidFill>
+            <a:tailEnd type="triangle"/>
+          </a:ln>
+        </p:spPr>
+        <p:style>
+          <a:lnRef idx="1">
+            <a:schemeClr val="accent1"/>
+          </a:lnRef>
+          <a:fillRef idx="0">
+            <a:schemeClr val="accent1"/>
+          </a:fillRef>
+          <a:effectRef idx="0">
+            <a:schemeClr val="accent1"/>
+          </a:effectRef>
+          <a:fontRef idx="minor">
+            <a:schemeClr val="tx1"/>
+          </a:fontRef>
+        </p:style>
+      </p:cxnSp>
+      <p:sp>
+        <p:nvSpPr>
+          <p:cNvPr id="68" name="Rechteck 67"/>
+          <p:cNvSpPr/>
+          <p:nvPr/>
+        </p:nvSpPr>
+        <p:spPr>
+          <a:xfrm>
+            <a:off x="4675520" y="655782"/>
+            <a:ext cx="2096296" cy="5116946"/>
+          </a:xfrm>
+          <a:prstGeom prst="rect">
+            <a:avLst/>
+          </a:prstGeom>
+          <a:noFill/>
+          <a:ln w="76200"/>
+        </p:spPr>
+        <p:style>
+          <a:lnRef idx="2">
+            <a:schemeClr val="accent1">
+              <a:shade val="50000"/>
+            </a:schemeClr>
+          </a:lnRef>
+          <a:fillRef idx="1">
+            <a:schemeClr val="accent1"/>
+          </a:fillRef>
+          <a:effectRef idx="0">
+            <a:schemeClr val="accent1"/>
+          </a:effectRef>
+          <a:fontRef idx="minor">
+            <a:schemeClr val="lt1"/>
+          </a:fontRef>
+        </p:style>
+        <p:txBody>
+          <a:bodyPr rtlCol="0" anchor="ctr"/>
+          <a:lstStyle/>
+          <a:p>
+            <a:pPr algn="ctr"/>
+            <a:endParaRPr lang="en-GB"/>
+          </a:p>
+        </p:txBody>
+      </p:sp>
+      <p:sp>
+        <p:nvSpPr>
+          <p:cNvPr id="69" name="Rechteck 68"/>
+          <p:cNvSpPr/>
+          <p:nvPr/>
+        </p:nvSpPr>
+        <p:spPr>
+          <a:xfrm>
+            <a:off x="5021882" y="1863130"/>
+            <a:ext cx="5433681" cy="1304943"/>
+          </a:xfrm>
+          <a:prstGeom prst="rect">
+            <a:avLst/>
+          </a:prstGeom>
+          <a:noFill/>
+          <a:ln w="76200">
+            <a:solidFill>
+              <a:srgbClr val="C00000"/>
+            </a:solidFill>
+          </a:ln>
+        </p:spPr>
+        <p:style>
+          <a:lnRef idx="2">
+            <a:schemeClr val="accent1">
+              <a:shade val="50000"/>
+            </a:schemeClr>
+          </a:lnRef>
+          <a:fillRef idx="1">
+            <a:schemeClr val="accent1"/>
+          </a:fillRef>
+          <a:effectRef idx="0">
+            <a:schemeClr val="accent1"/>
+          </a:effectRef>
+          <a:fontRef idx="minor">
+            <a:schemeClr val="lt1"/>
+          </a:fontRef>
+        </p:style>
+        <p:txBody>
+          <a:bodyPr rtlCol="0" anchor="ctr"/>
+          <a:lstStyle/>
+          <a:p>
+            <a:pPr algn="ctr"/>
+            <a:endParaRPr lang="en-GB"/>
+          </a:p>
+        </p:txBody>
+      </p:sp>
+    </p:spTree>
+    <p:extLst>
+      <p:ext uri="{BB962C8B-B14F-4D97-AF65-F5344CB8AC3E}">
+        <p14:creationId xmlns:p14="http://schemas.microsoft.com/office/powerpoint/2010/main" val="871326192"/>
+      </p:ext>
+    </p:extLst>
+  </p:cSld>
+  <p:clrMapOvr>
+    <a:masterClrMapping/>
+  </p:clrMapOvr>
+</p:sld>
+</file>
+
+<file path=ppt/slides/slide3.xml><?xml version="1.0" encoding="utf-8"?>
+<p:sld xmlns:a="http://schemas.openxmlformats.org/drawingml/2006/main" xmlns:r="http://schemas.openxmlformats.org/officeDocument/2006/relationships" xmlns:p="http://schemas.openxmlformats.org/presentationml/2006/main">
+  <p:cSld>
+    <p:spTree>
+      <p:nvGrpSpPr>
+        <p:cNvPr id="1" name=""/>
+        <p:cNvGrpSpPr/>
+        <p:nvPr/>
+      </p:nvGrpSpPr>
+      <p:grpSpPr>
+        <a:xfrm>
+          <a:off x="0" y="0"/>
+          <a:ext cx="0" cy="0"/>
+          <a:chOff x="0" y="0"/>
+          <a:chExt cx="0" cy="0"/>
+        </a:xfrm>
+      </p:grpSpPr>
+      <p:sp>
+        <p:nvSpPr>
+          <p:cNvPr id="5" name="Parallelogramm 4"/>
+          <p:cNvSpPr/>
+          <p:nvPr/>
+        </p:nvSpPr>
+        <p:spPr>
+          <a:xfrm>
+            <a:off x="377645" y="670162"/>
+            <a:ext cx="11309979" cy="3329183"/>
+          </a:xfrm>
+          <a:prstGeom prst="parallelogram">
+            <a:avLst>
+              <a:gd name="adj" fmla="val 76462"/>
+            </a:avLst>
+          </a:prstGeom>
+        </p:spPr>
+        <p:style>
+          <a:lnRef idx="2">
+            <a:schemeClr val="accent6">
+              <a:shade val="50000"/>
+            </a:schemeClr>
+          </a:lnRef>
+          <a:fillRef idx="1">
+            <a:schemeClr val="accent6"/>
+          </a:fillRef>
+          <a:effectRef idx="0">
+            <a:schemeClr val="accent6"/>
+          </a:effectRef>
+          <a:fontRef idx="minor">
+            <a:schemeClr val="lt1"/>
+          </a:fontRef>
+        </p:style>
+        <p:txBody>
           <a:bodyPr rtlCol="0" anchor="ctr"/>
           <a:lstStyle/>
           <a:p>
@@ -4593,6 +6305,347 @@
     <p:extLst>
       <p:ext uri="{BB962C8B-B14F-4D97-AF65-F5344CB8AC3E}">
         <p14:creationId xmlns:p14="http://schemas.microsoft.com/office/powerpoint/2010/main" val="2794240359"/>
+      </p:ext>
+    </p:extLst>
+  </p:cSld>
+  <p:clrMapOvr>
+    <a:masterClrMapping/>
+  </p:clrMapOvr>
+</p:sld>
+</file>
+
+<file path=ppt/slides/slide4.xml><?xml version="1.0" encoding="utf-8"?>
+<p:sld xmlns:a="http://schemas.openxmlformats.org/drawingml/2006/main" xmlns:r="http://schemas.openxmlformats.org/officeDocument/2006/relationships" xmlns:p="http://schemas.openxmlformats.org/presentationml/2006/main">
+  <p:cSld>
+    <p:spTree>
+      <p:nvGrpSpPr>
+        <p:cNvPr id="1" name=""/>
+        <p:cNvGrpSpPr/>
+        <p:nvPr/>
+      </p:nvGrpSpPr>
+      <p:grpSpPr>
+        <a:xfrm>
+          <a:off x="0" y="0"/>
+          <a:ext cx="0" cy="0"/>
+          <a:chOff x="0" y="0"/>
+          <a:chExt cx="0" cy="0"/>
+        </a:xfrm>
+      </p:grpSpPr>
+      <p:sp>
+        <p:nvSpPr>
+          <p:cNvPr id="4" name="Textfeld 3"/>
+          <p:cNvSpPr txBox="1"/>
+          <p:nvPr/>
+        </p:nvSpPr>
+        <p:spPr>
+          <a:xfrm>
+            <a:off x="1440611" y="1233577"/>
+            <a:ext cx="1431802" cy="369332"/>
+          </a:xfrm>
+          <a:prstGeom prst="rect">
+            <a:avLst/>
+          </a:prstGeom>
+          <a:noFill/>
+        </p:spPr>
+        <p:txBody>
+          <a:bodyPr wrap="none" rtlCol="0">
+            <a:spAutoFit/>
+          </a:bodyPr>
+          <a:lstStyle/>
+          <a:p>
+            <a:r>
+              <a:rPr lang="de-AT" dirty="0" err="1" smtClean="0"/>
+              <a:t>Full</a:t>
+            </a:r>
+            <a:r>
+              <a:rPr lang="de-AT" dirty="0" smtClean="0"/>
+              <a:t> SLAM BN</a:t>
+            </a:r>
+            <a:endParaRPr lang="en-GB" dirty="0"/>
+          </a:p>
+        </p:txBody>
+      </p:sp>
+      <p:sp>
+        <p:nvSpPr>
+          <p:cNvPr id="5" name="Textfeld 4"/>
+          <p:cNvSpPr txBox="1"/>
+          <p:nvPr/>
+        </p:nvSpPr>
+        <p:spPr>
+          <a:xfrm>
+            <a:off x="1544129" y="3683480"/>
+            <a:ext cx="1082027" cy="369332"/>
+          </a:xfrm>
+          <a:prstGeom prst="rect">
+            <a:avLst/>
+          </a:prstGeom>
+          <a:noFill/>
+        </p:spPr>
+        <p:txBody>
+          <a:bodyPr wrap="none" rtlCol="0">
+            <a:spAutoFit/>
+          </a:bodyPr>
+          <a:lstStyle/>
+          <a:p>
+            <a:r>
+              <a:rPr lang="de-AT" dirty="0" err="1" smtClean="0"/>
+              <a:t>Neur</a:t>
+            </a:r>
+            <a:r>
+              <a:rPr lang="de-AT" dirty="0" smtClean="0"/>
+              <a:t> </a:t>
+            </a:r>
+            <a:r>
+              <a:rPr lang="de-AT" dirty="0" err="1" smtClean="0"/>
+              <a:t>corr</a:t>
+            </a:r>
+            <a:endParaRPr lang="en-GB" dirty="0"/>
+          </a:p>
+        </p:txBody>
+      </p:sp>
+      <p:sp>
+        <p:nvSpPr>
+          <p:cNvPr id="6" name="Textfeld 5"/>
+          <p:cNvSpPr txBox="1"/>
+          <p:nvPr/>
+        </p:nvSpPr>
+        <p:spPr>
+          <a:xfrm>
+            <a:off x="4692771" y="1233577"/>
+            <a:ext cx="1597681" cy="369332"/>
+          </a:xfrm>
+          <a:prstGeom prst="rect">
+            <a:avLst/>
+          </a:prstGeom>
+          <a:noFill/>
+        </p:spPr>
+        <p:txBody>
+          <a:bodyPr wrap="none" rtlCol="0">
+            <a:spAutoFit/>
+          </a:bodyPr>
+          <a:lstStyle/>
+          <a:p>
+            <a:r>
+              <a:rPr lang="de-AT" dirty="0" err="1" smtClean="0"/>
+              <a:t>Local</a:t>
+            </a:r>
+            <a:r>
+              <a:rPr lang="de-AT" dirty="0" smtClean="0"/>
+              <a:t> </a:t>
+            </a:r>
+            <a:r>
+              <a:rPr lang="de-AT" dirty="0" err="1" smtClean="0"/>
+              <a:t>inference</a:t>
+            </a:r>
+            <a:endParaRPr lang="en-GB" dirty="0"/>
+          </a:p>
+        </p:txBody>
+      </p:sp>
+      <p:sp>
+        <p:nvSpPr>
+          <p:cNvPr id="7" name="Textfeld 6"/>
+          <p:cNvSpPr txBox="1"/>
+          <p:nvPr/>
+        </p:nvSpPr>
+        <p:spPr>
+          <a:xfrm>
+            <a:off x="9046235" y="1233577"/>
+            <a:ext cx="1991443" cy="369332"/>
+          </a:xfrm>
+          <a:prstGeom prst="rect">
+            <a:avLst/>
+          </a:prstGeom>
+          <a:noFill/>
+        </p:spPr>
+        <p:txBody>
+          <a:bodyPr wrap="none" rtlCol="0">
+            <a:spAutoFit/>
+          </a:bodyPr>
+          <a:lstStyle/>
+          <a:p>
+            <a:r>
+              <a:rPr lang="de-AT" dirty="0" smtClean="0"/>
+              <a:t>Global </a:t>
+            </a:r>
+            <a:r>
+              <a:rPr lang="de-AT" dirty="0" err="1" smtClean="0"/>
+              <a:t>loop</a:t>
+            </a:r>
+            <a:r>
+              <a:rPr lang="de-AT" dirty="0" smtClean="0"/>
+              <a:t> </a:t>
+            </a:r>
+            <a:r>
+              <a:rPr lang="de-AT" dirty="0" err="1" smtClean="0"/>
+              <a:t>closure</a:t>
+            </a:r>
+            <a:endParaRPr lang="en-GB" dirty="0"/>
+          </a:p>
+        </p:txBody>
+      </p:sp>
+      <p:sp>
+        <p:nvSpPr>
+          <p:cNvPr id="8" name="Textfeld 7"/>
+          <p:cNvSpPr txBox="1"/>
+          <p:nvPr/>
+        </p:nvSpPr>
+        <p:spPr>
+          <a:xfrm>
+            <a:off x="1615498" y="5241986"/>
+            <a:ext cx="2073645" cy="369332"/>
+          </a:xfrm>
+          <a:prstGeom prst="rect">
+            <a:avLst/>
+          </a:prstGeom>
+          <a:noFill/>
+        </p:spPr>
+        <p:txBody>
+          <a:bodyPr wrap="none" rtlCol="0">
+            <a:spAutoFit/>
+          </a:bodyPr>
+          <a:lstStyle/>
+          <a:p>
+            <a:r>
+              <a:rPr lang="de-AT" dirty="0" err="1" smtClean="0"/>
+              <a:t>Example</a:t>
+            </a:r>
+            <a:r>
+              <a:rPr lang="de-AT" dirty="0" smtClean="0"/>
+              <a:t> </a:t>
+            </a:r>
+            <a:r>
+              <a:rPr lang="de-AT" dirty="0" err="1" smtClean="0"/>
+              <a:t>firing</a:t>
+            </a:r>
+            <a:r>
+              <a:rPr lang="de-AT" dirty="0" smtClean="0"/>
+              <a:t> </a:t>
+            </a:r>
+            <a:r>
+              <a:rPr lang="de-AT" dirty="0" err="1" smtClean="0"/>
+              <a:t>fields</a:t>
+            </a:r>
+            <a:endParaRPr lang="en-GB" dirty="0"/>
+          </a:p>
+        </p:txBody>
+      </p:sp>
+    </p:spTree>
+    <p:extLst>
+      <p:ext uri="{BB962C8B-B14F-4D97-AF65-F5344CB8AC3E}">
+        <p14:creationId xmlns:p14="http://schemas.microsoft.com/office/powerpoint/2010/main" val="2961083313"/>
+      </p:ext>
+    </p:extLst>
+  </p:cSld>
+  <p:clrMapOvr>
+    <a:masterClrMapping/>
+  </p:clrMapOvr>
+</p:sld>
+</file>
+
+<file path=ppt/slides/slide5.xml><?xml version="1.0" encoding="utf-8"?>
+<p:sld xmlns:a="http://schemas.openxmlformats.org/drawingml/2006/main" xmlns:r="http://schemas.openxmlformats.org/officeDocument/2006/relationships" xmlns:p="http://schemas.openxmlformats.org/presentationml/2006/main">
+  <p:cSld>
+    <p:spTree>
+      <p:nvGrpSpPr>
+        <p:cNvPr id="1" name=""/>
+        <p:cNvGrpSpPr/>
+        <p:nvPr/>
+      </p:nvGrpSpPr>
+      <p:grpSpPr>
+        <a:xfrm>
+          <a:off x="0" y="0"/>
+          <a:ext cx="0" cy="0"/>
+          <a:chOff x="0" y="0"/>
+          <a:chExt cx="0" cy="0"/>
+        </a:xfrm>
+      </p:grpSpPr>
+      <p:pic>
+        <p:nvPicPr>
+          <p:cNvPr id="7" name="Grafik 6"/>
+          <p:cNvPicPr>
+            <a:picLocks noChangeAspect="1"/>
+          </p:cNvPicPr>
+          <p:nvPr/>
+        </p:nvPicPr>
+        <p:blipFill>
+          <a:blip r:embed="rId3"/>
+          <a:stretch>
+            <a:fillRect/>
+          </a:stretch>
+        </p:blipFill>
+        <p:spPr>
+          <a:xfrm>
+            <a:off x="1536308" y="451570"/>
+            <a:ext cx="7754341" cy="5245584"/>
+          </a:xfrm>
+          <a:prstGeom prst="rect">
+            <a:avLst/>
+          </a:prstGeom>
+        </p:spPr>
+      </p:pic>
+    </p:spTree>
+    <p:extLst>
+      <p:ext uri="{BB962C8B-B14F-4D97-AF65-F5344CB8AC3E}">
+        <p14:creationId xmlns:p14="http://schemas.microsoft.com/office/powerpoint/2010/main" val="3642365047"/>
+      </p:ext>
+    </p:extLst>
+  </p:cSld>
+  <p:clrMapOvr>
+    <a:masterClrMapping/>
+  </p:clrMapOvr>
+</p:sld>
+</file>
+
+<file path=ppt/slides/slide6.xml><?xml version="1.0" encoding="utf-8"?>
+<p:sld xmlns:a="http://schemas.openxmlformats.org/drawingml/2006/main" xmlns:r="http://schemas.openxmlformats.org/officeDocument/2006/relationships" xmlns:p="http://schemas.openxmlformats.org/presentationml/2006/main">
+  <p:cSld>
+    <p:spTree>
+      <p:nvGrpSpPr>
+        <p:cNvPr id="1" name=""/>
+        <p:cNvGrpSpPr/>
+        <p:nvPr/>
+      </p:nvGrpSpPr>
+      <p:grpSpPr>
+        <a:xfrm>
+          <a:off x="0" y="0"/>
+          <a:ext cx="0" cy="0"/>
+          <a:chOff x="0" y="0"/>
+          <a:chExt cx="0" cy="0"/>
+        </a:xfrm>
+      </p:grpSpPr>
+      <p:pic>
+        <p:nvPicPr>
+          <p:cNvPr id="4" name="Inhaltsplatzhalter 3"/>
+          <p:cNvPicPr>
+            <a:picLocks noGrp="1" noChangeAspect="1"/>
+          </p:cNvPicPr>
+          <p:nvPr>
+            <p:ph idx="1"/>
+          </p:nvPr>
+        </p:nvPicPr>
+        <p:blipFill>
+          <a:blip r:embed="rId2" cstate="print">
+            <a:extLst>
+              <a:ext uri="{28A0092B-C50C-407E-A947-70E740481C1C}">
+                <a14:useLocalDpi xmlns:a14="http://schemas.microsoft.com/office/drawing/2010/main" val="0"/>
+              </a:ext>
+            </a:extLst>
+          </a:blip>
+          <a:stretch>
+            <a:fillRect/>
+          </a:stretch>
+        </p:blipFill>
+        <p:spPr>
+          <a:xfrm>
+            <a:off x="3855526" y="1865985"/>
+            <a:ext cx="4480948" cy="4270618"/>
+          </a:xfrm>
+        </p:spPr>
+      </p:pic>
+    </p:spTree>
+    <p:extLst>
+      <p:ext uri="{BB962C8B-B14F-4D97-AF65-F5344CB8AC3E}">
+        <p14:creationId xmlns:p14="http://schemas.microsoft.com/office/powerpoint/2010/main" val="3073796024"/>
       </p:ext>
     </p:extLst>
   </p:cSld>

</xml_diff>